<commit_message>
inital dataloader working for shapenet
</commit_message>
<xml_diff>
--- a/PowerPoints/EECE5554_Final_Project.pptx
+++ b/PowerPoints/EECE5554_Final_Project.pptx
@@ -318,7 +318,7 @@
           <a:p>
             <a:fld id="{FB67E610-DBB5-964A-A213-D459E2805448}" type="datetimeFigureOut">
               <a:rPr lang="en-US" smtClean="0"/>
-              <a:t>4/15/20</a:t>
+              <a:t>4/16/20</a:t>
             </a:fld>
             <a:endParaRPr lang="en-US"/>
           </a:p>
@@ -1879,14 +1879,14 @@
           </a:ln>
           <a:extLst>
             <a:ext uri="{909E8E84-426E-40dd-AFC4-6F175D3DCCD1}">
-              <a14:hiddenFill xmlns="" xmlns:a14="http://schemas.microsoft.com/office/drawing/2010/main">
+              <a14:hiddenFill xmlns:a14="http://schemas.microsoft.com/office/drawing/2010/main" xmlns="">
                 <a:solidFill>
                   <a:srgbClr val="FFFFFF"/>
                 </a:solidFill>
               </a14:hiddenFill>
             </a:ext>
             <a:ext uri="{91240B29-F687-4f45-9708-019B960494DF}">
-              <a14:hiddenLine xmlns="" xmlns:a14="http://schemas.microsoft.com/office/drawing/2010/main" w="9525">
+              <a14:hiddenLine xmlns:a14="http://schemas.microsoft.com/office/drawing/2010/main" xmlns="" w="9525">
                 <a:solidFill>
                   <a:srgbClr val="000000"/>
                 </a:solidFill>
@@ -2104,14 +2104,14 @@
           </a:ln>
           <a:extLst>
             <a:ext uri="{909E8E84-426E-40dd-AFC4-6F175D3DCCD1}">
-              <a14:hiddenFill xmlns="" xmlns:a14="http://schemas.microsoft.com/office/drawing/2010/main">
+              <a14:hiddenFill xmlns:a14="http://schemas.microsoft.com/office/drawing/2010/main" xmlns="">
                 <a:solidFill>
                   <a:srgbClr val="FFFFFF"/>
                 </a:solidFill>
               </a14:hiddenFill>
             </a:ext>
             <a:ext uri="{91240B29-F687-4f45-9708-019B960494DF}">
-              <a14:hiddenLine xmlns="" xmlns:a14="http://schemas.microsoft.com/office/drawing/2010/main" w="9525">
+              <a14:hiddenLine xmlns:a14="http://schemas.microsoft.com/office/drawing/2010/main" xmlns="" w="9525">
                 <a:solidFill>
                   <a:srgbClr val="000000"/>
                 </a:solidFill>
@@ -2275,7 +2275,7 @@
             <a:fld id="{79279E35-9C39-41A3-B9D2-5278FD6D8DDC}" type="datetimeFigureOut">
               <a:rPr lang="en-US" altLang="en-US"/>
               <a:pPr/>
-              <a:t>4/15/20</a:t>
+              <a:t>4/16/20</a:t>
             </a:fld>
             <a:endParaRPr lang="en-US" altLang="en-US"/>
           </a:p>
@@ -2639,7 +2639,7 @@
             <a:fld id="{BF458AF3-BD15-4BFB-A60F-262C4444305D}" type="datetimeFigureOut">
               <a:rPr lang="en-US" altLang="en-US"/>
               <a:pPr/>
-              <a:t>4/15/20</a:t>
+              <a:t>4/16/20</a:t>
             </a:fld>
             <a:endParaRPr lang="en-US" altLang="en-US"/>
           </a:p>
@@ -2922,7 +2922,7 @@
             <a:fld id="{4E4E1B3A-F39C-4D4C-AF0D-7BF0EBF1902C}" type="datetimeFigureOut">
               <a:rPr lang="en-US" altLang="en-US"/>
               <a:pPr/>
-              <a:t>4/15/20</a:t>
+              <a:t>4/16/20</a:t>
             </a:fld>
             <a:endParaRPr lang="en-US" altLang="en-US"/>
           </a:p>
@@ -3253,7 +3253,7 @@
             <a:fld id="{11EB6960-3233-4EAA-8FC5-02B034967A69}" type="datetimeFigureOut">
               <a:rPr lang="en-US" altLang="en-US"/>
               <a:pPr/>
-              <a:t>4/15/20</a:t>
+              <a:t>4/16/20</a:t>
             </a:fld>
             <a:endParaRPr lang="en-US" altLang="en-US"/>
           </a:p>
@@ -3715,7 +3715,7 @@
             <a:fld id="{E187BA0A-8D26-4FB9-BFB6-61C76F975855}" type="datetimeFigureOut">
               <a:rPr lang="en-US" altLang="en-US"/>
               <a:pPr/>
-              <a:t>4/15/20</a:t>
+              <a:t>4/16/20</a:t>
             </a:fld>
             <a:endParaRPr lang="en-US" altLang="en-US"/>
           </a:p>
@@ -3881,7 +3881,7 @@
             <a:fld id="{03AC124E-09A9-42FF-9A8C-8BCA62660993}" type="datetimeFigureOut">
               <a:rPr lang="en-US" altLang="en-US"/>
               <a:pPr/>
-              <a:t>4/15/20</a:t>
+              <a:t>4/16/20</a:t>
             </a:fld>
             <a:endParaRPr lang="en-US" altLang="en-US"/>
           </a:p>
@@ -4011,7 +4011,7 @@
             <a:fld id="{E4803E2A-D4C0-49FB-A4B7-C3A8CF9033CC}" type="datetimeFigureOut">
               <a:rPr lang="en-US" altLang="en-US"/>
               <a:pPr/>
-              <a:t>4/15/20</a:t>
+              <a:t>4/16/20</a:t>
             </a:fld>
             <a:endParaRPr lang="en-US" altLang="en-US"/>
           </a:p>
@@ -4324,7 +4324,7 @@
             <a:fld id="{018C8D68-1076-49DE-A007-41D011960D8A}" type="datetimeFigureOut">
               <a:rPr lang="en-US" altLang="en-US"/>
               <a:pPr/>
-              <a:t>4/15/20</a:t>
+              <a:t>4/16/20</a:t>
             </a:fld>
             <a:endParaRPr lang="en-US" altLang="en-US"/>
           </a:p>
@@ -4620,7 +4620,7 @@
             <a:fld id="{05E9DDD0-ED68-4B58-8EE7-EAAD76738E86}" type="datetimeFigureOut">
               <a:rPr lang="en-US" altLang="en-US"/>
               <a:pPr/>
-              <a:t>4/15/20</a:t>
+              <a:t>4/16/20</a:t>
             </a:fld>
             <a:endParaRPr lang="en-US" altLang="en-US"/>
           </a:p>
@@ -4867,7 +4867,7 @@
             <a:fld id="{AB3985E2-B91B-43B4-A7C6-C571D16267EB}" type="datetimeFigureOut">
               <a:rPr lang="en-US" altLang="en-US"/>
               <a:pPr/>
-              <a:t>4/15/20</a:t>
+              <a:t>4/16/20</a:t>
             </a:fld>
             <a:endParaRPr lang="en-US" altLang="en-US"/>
           </a:p>
@@ -7077,6 +7077,13 @@
             <a:r>
               <a:rPr lang="en-US" sz="2000" dirty="0"/>
               <a:t> used in training</a:t>
+            </a:r>
+          </a:p>
+          <a:p>
+            <a:pPr lvl="1"/>
+            <a:r>
+              <a:rPr lang="en-US" sz="2000" dirty="0"/>
+              <a:t>Point clouds do not have equal number of points </a:t>
             </a:r>
           </a:p>
         </p:txBody>

</xml_diff>